<commit_message>
Presentation update, sample code removed
</commit_message>
<xml_diff>
--- a/First term/1. Язык С - начало.pptx
+++ b/First term/1. Язык С - начало.pptx
@@ -228,10 +228,6 @@
     </p:ext>
   </p:extLst>
 </p:presentation>
-</file>
-
-<file path=ppt/revisionInfo.xml><?xml version="1.0" encoding="utf-8"?>
-<p1510:revInfo xmlns:a="http://schemas.openxmlformats.org/drawingml/2006/main" xmlns:r="http://schemas.openxmlformats.org/officeDocument/2006/relationships" xmlns:p1510="http://schemas.microsoft.com/office/powerpoint/2015/10/main"/>
 </file>
 
 <file path=ppt/diagrams/colors1.xml><?xml version="1.0" encoding="utf-8"?>
@@ -14988,7 +14984,7 @@
           <a:p>
             <a:fld id="{0FE49196-CD65-4FCA-A948-82134182D391}" type="datetimeFigureOut">
               <a:rPr lang="ru-RU" smtClean="0"/>
-              <a:t>20.09.2017</a:t>
+              <a:t>21.09.2021</a:t>
             </a:fld>
             <a:endParaRPr lang="ru-RU"/>
           </a:p>
@@ -15766,7 +15762,7 @@
           <a:p>
             <a:fld id="{35DCE78D-1C97-46CC-9E74-9CCE596C76F5}" type="datetimeFigureOut">
               <a:rPr lang="ru-RU" smtClean="0"/>
-              <a:t>20.09.2017</a:t>
+              <a:t>21.09.2021</a:t>
             </a:fld>
             <a:endParaRPr lang="ru-RU"/>
           </a:p>
@@ -15936,7 +15932,7 @@
           <a:p>
             <a:fld id="{35DCE78D-1C97-46CC-9E74-9CCE596C76F5}" type="datetimeFigureOut">
               <a:rPr lang="ru-RU" smtClean="0"/>
-              <a:t>20.09.2017</a:t>
+              <a:t>21.09.2021</a:t>
             </a:fld>
             <a:endParaRPr lang="ru-RU"/>
           </a:p>
@@ -16116,7 +16112,7 @@
           <a:p>
             <a:fld id="{35DCE78D-1C97-46CC-9E74-9CCE596C76F5}" type="datetimeFigureOut">
               <a:rPr lang="ru-RU" smtClean="0"/>
-              <a:t>20.09.2017</a:t>
+              <a:t>21.09.2021</a:t>
             </a:fld>
             <a:endParaRPr lang="ru-RU"/>
           </a:p>
@@ -16286,7 +16282,7 @@
           <a:p>
             <a:fld id="{35DCE78D-1C97-46CC-9E74-9CCE596C76F5}" type="datetimeFigureOut">
               <a:rPr lang="ru-RU" smtClean="0"/>
-              <a:t>20.09.2017</a:t>
+              <a:t>21.09.2021</a:t>
             </a:fld>
             <a:endParaRPr lang="ru-RU"/>
           </a:p>
@@ -16530,7 +16526,7 @@
           <a:p>
             <a:fld id="{35DCE78D-1C97-46CC-9E74-9CCE596C76F5}" type="datetimeFigureOut">
               <a:rPr lang="ru-RU" smtClean="0"/>
-              <a:t>20.09.2017</a:t>
+              <a:t>21.09.2021</a:t>
             </a:fld>
             <a:endParaRPr lang="ru-RU"/>
           </a:p>
@@ -16762,7 +16758,7 @@
           <a:p>
             <a:fld id="{35DCE78D-1C97-46CC-9E74-9CCE596C76F5}" type="datetimeFigureOut">
               <a:rPr lang="ru-RU" smtClean="0"/>
-              <a:t>20.09.2017</a:t>
+              <a:t>21.09.2021</a:t>
             </a:fld>
             <a:endParaRPr lang="ru-RU"/>
           </a:p>
@@ -17129,7 +17125,7 @@
           <a:p>
             <a:fld id="{35DCE78D-1C97-46CC-9E74-9CCE596C76F5}" type="datetimeFigureOut">
               <a:rPr lang="ru-RU" smtClean="0"/>
-              <a:t>20.09.2017</a:t>
+              <a:t>21.09.2021</a:t>
             </a:fld>
             <a:endParaRPr lang="ru-RU"/>
           </a:p>
@@ -17247,7 +17243,7 @@
           <a:p>
             <a:fld id="{35DCE78D-1C97-46CC-9E74-9CCE596C76F5}" type="datetimeFigureOut">
               <a:rPr lang="ru-RU" smtClean="0"/>
-              <a:t>20.09.2017</a:t>
+              <a:t>21.09.2021</a:t>
             </a:fld>
             <a:endParaRPr lang="ru-RU"/>
           </a:p>
@@ -17342,7 +17338,7 @@
           <a:p>
             <a:fld id="{35DCE78D-1C97-46CC-9E74-9CCE596C76F5}" type="datetimeFigureOut">
               <a:rPr lang="ru-RU" smtClean="0"/>
-              <a:t>20.09.2017</a:t>
+              <a:t>21.09.2021</a:t>
             </a:fld>
             <a:endParaRPr lang="ru-RU"/>
           </a:p>
@@ -17619,7 +17615,7 @@
           <a:p>
             <a:fld id="{35DCE78D-1C97-46CC-9E74-9CCE596C76F5}" type="datetimeFigureOut">
               <a:rPr lang="ru-RU" smtClean="0"/>
-              <a:t>20.09.2017</a:t>
+              <a:t>21.09.2021</a:t>
             </a:fld>
             <a:endParaRPr lang="ru-RU"/>
           </a:p>
@@ -17876,7 +17872,7 @@
           <a:p>
             <a:fld id="{35DCE78D-1C97-46CC-9E74-9CCE596C76F5}" type="datetimeFigureOut">
               <a:rPr lang="ru-RU" smtClean="0"/>
-              <a:t>20.09.2017</a:t>
+              <a:t>21.09.2021</a:t>
             </a:fld>
             <a:endParaRPr lang="ru-RU"/>
           </a:p>
@@ -18089,7 +18085,7 @@
           <a:p>
             <a:fld id="{35DCE78D-1C97-46CC-9E74-9CCE596C76F5}" type="datetimeFigureOut">
               <a:rPr lang="ru-RU" smtClean="0"/>
-              <a:t>20.09.2017</a:t>
+              <a:t>21.09.2021</a:t>
             </a:fld>
             <a:endParaRPr lang="ru-RU"/>
           </a:p>
@@ -24714,8 +24710,8 @@
         </p:nvSpPr>
         <p:spPr>
           <a:xfrm>
-            <a:off x="7148146" y="2337583"/>
-            <a:ext cx="1503485" cy="923330"/>
+            <a:off x="7056167" y="2337583"/>
+            <a:ext cx="1667380" cy="507831"/>
           </a:xfrm>
           <a:prstGeom prst="rect">
             <a:avLst/>
@@ -25007,8 +25003,8 @@
         </p:nvSpPr>
         <p:spPr>
           <a:xfrm>
-            <a:off x="971885" y="3934741"/>
-            <a:ext cx="7675350" cy="2039633"/>
+            <a:off x="971885" y="3697347"/>
+            <a:ext cx="7675350" cy="2277027"/>
           </a:xfrm>
           <a:prstGeom prst="rect">
             <a:avLst/>
@@ -25733,7 +25729,7 @@
         </p:spPr>
         <p:txBody>
           <a:bodyPr vert="horz" lIns="68580" tIns="34290" rIns="68580" bIns="34290" rtlCol="0">
-            <a:normAutofit lnSpcReduction="10000"/>
+            <a:normAutofit fontScale="85000" lnSpcReduction="20000"/>
           </a:bodyPr>
           <a:lstStyle>
             <a:lvl1pPr marL="228600" indent="-228600" algn="l" defTabSz="914400" rtl="0" eaLnBrk="1" latinLnBrk="0" hangingPunct="1">
@@ -26050,6 +26046,44 @@
                   <a:schemeClr val="tx1"/>
                 </a:solidFill>
               </a:rPr>
+              <a:t>-96 = </a:t>
+            </a:r>
+            <a:r>
+              <a:rPr lang="en-US" sz="2400" dirty="0">
+                <a:solidFill>
+                  <a:schemeClr val="tx1"/>
+                </a:solidFill>
+                <a:latin typeface="Courier New" panose="02070309020205020404" pitchFamily="49" charset="0"/>
+                <a:cs typeface="Courier New" panose="02070309020205020404" pitchFamily="49" charset="0"/>
+              </a:rPr>
+              <a:t>10100000</a:t>
+            </a:r>
+            <a:r>
+              <a:rPr lang="en-US" sz="2400" baseline="-25000" dirty="0">
+                <a:solidFill>
+                  <a:schemeClr val="tx1"/>
+                </a:solidFill>
+                <a:latin typeface="Courier New" panose="02070309020205020404" pitchFamily="49" charset="0"/>
+                <a:cs typeface="Courier New" panose="02070309020205020404" pitchFamily="49" charset="0"/>
+              </a:rPr>
+              <a:t>2</a:t>
+            </a:r>
+            <a:endParaRPr lang="en-US" sz="2400" dirty="0">
+              <a:solidFill>
+                <a:schemeClr val="tx1"/>
+              </a:solidFill>
+            </a:endParaRPr>
+          </a:p>
+          <a:p>
+            <a:pPr marL="0" indent="0">
+              <a:buNone/>
+            </a:pPr>
+            <a:r>
+              <a:rPr lang="en-US" sz="2400" dirty="0">
+                <a:solidFill>
+                  <a:schemeClr val="tx1"/>
+                </a:solidFill>
+              </a:rPr>
               <a:t>37 = </a:t>
             </a:r>
             <a:r>
@@ -27315,9 +27349,7 @@
           <p:cNvGraphicFramePr>
             <a:graphicFrameLocks noGrp="1"/>
           </p:cNvGraphicFramePr>
-          <p:nvPr>
-            <p:extLst/>
-          </p:nvPr>
+          <p:nvPr/>
         </p:nvGraphicFramePr>
         <p:xfrm>
           <a:off x="210481" y="3058631"/>
@@ -27365,9 +27397,7 @@
           <p:cNvGraphicFramePr>
             <a:graphicFrameLocks noGrp="1"/>
           </p:cNvGraphicFramePr>
-          <p:nvPr>
-            <p:extLst/>
-          </p:nvPr>
+          <p:nvPr/>
         </p:nvGraphicFramePr>
         <p:xfrm>
           <a:off x="495299" y="3058631"/>
@@ -27534,9 +27564,7 @@
           <p:cNvGraphicFramePr>
             <a:graphicFrameLocks noGrp="1"/>
           </p:cNvGraphicFramePr>
-          <p:nvPr>
-            <p:extLst/>
-          </p:nvPr>
+          <p:nvPr/>
         </p:nvGraphicFramePr>
         <p:xfrm>
           <a:off x="2882412" y="3058631"/>
@@ -29016,9 +29044,7 @@
         <p:nvGraphicFramePr>
           <p:cNvPr id="5" name="Diagram 4"/>
           <p:cNvGraphicFramePr/>
-          <p:nvPr>
-            <p:extLst/>
-          </p:nvPr>
+          <p:nvPr/>
         </p:nvGraphicFramePr>
         <p:xfrm>
           <a:off x="1649570" y="1936750"/>
@@ -29062,7 +29088,6 @@
           </p:cNvGraphicFramePr>
           <p:nvPr>
             <p:ph idx="1"/>
-            <p:extLst/>
           </p:nvPr>
         </p:nvGraphicFramePr>
         <p:xfrm>
@@ -29208,7 +29233,6 @@
           </p:cNvGraphicFramePr>
           <p:nvPr>
             <p:ph idx="1"/>
-            <p:extLst/>
           </p:nvPr>
         </p:nvGraphicFramePr>
         <p:xfrm>
@@ -29456,9 +29480,7 @@
           <p:cNvGraphicFramePr>
             <a:graphicFrameLocks/>
           </p:cNvGraphicFramePr>
-          <p:nvPr>
-            <p:extLst/>
-          </p:nvPr>
+          <p:nvPr/>
         </p:nvGraphicFramePr>
         <p:xfrm>
           <a:off x="2036014" y="3088515"/>
@@ -29474,9 +29496,7 @@
         <p:nvGraphicFramePr>
           <p:cNvPr id="5" name="Diagram 4"/>
           <p:cNvGraphicFramePr/>
-          <p:nvPr>
-            <p:extLst/>
-          </p:nvPr>
+          <p:nvPr/>
         </p:nvGraphicFramePr>
         <p:xfrm>
           <a:off x="1659227" y="2202539"/>

</xml_diff>